<commit_message>
project about IMU Data steps analyzing
</commit_message>
<xml_diff>
--- a/Project_Presentation.pptx
+++ b/Project_Presentation.pptx
@@ -5,7 +5,7 @@
     <p:sldMasterId id="2147483687" r:id="rId1"/>
   </p:sldMasterIdLst>
   <p:notesMasterIdLst>
-    <p:notesMasterId r:id="rId18"/>
+    <p:notesMasterId r:id="rId22"/>
   </p:notesMasterIdLst>
   <p:sldIdLst>
     <p:sldId id="256" r:id="rId2"/>
@@ -17,13 +17,17 @@
     <p:sldId id="272" r:id="rId8"/>
     <p:sldId id="273" r:id="rId9"/>
     <p:sldId id="274" r:id="rId10"/>
-    <p:sldId id="263" r:id="rId11"/>
-    <p:sldId id="275" r:id="rId12"/>
-    <p:sldId id="262" r:id="rId13"/>
-    <p:sldId id="264" r:id="rId14"/>
-    <p:sldId id="265" r:id="rId15"/>
-    <p:sldId id="269" r:id="rId16"/>
-    <p:sldId id="270" r:id="rId17"/>
+    <p:sldId id="276" r:id="rId11"/>
+    <p:sldId id="263" r:id="rId12"/>
+    <p:sldId id="275" r:id="rId13"/>
+    <p:sldId id="262" r:id="rId14"/>
+    <p:sldId id="264" r:id="rId15"/>
+    <p:sldId id="277" r:id="rId16"/>
+    <p:sldId id="265" r:id="rId17"/>
+    <p:sldId id="269" r:id="rId18"/>
+    <p:sldId id="278" r:id="rId19"/>
+    <p:sldId id="279" r:id="rId20"/>
+    <p:sldId id="270" r:id="rId21"/>
   </p:sldIdLst>
   <p:sldSz cx="12192000" cy="6858000"/>
   <p:notesSz cx="6858000" cy="9144000"/>
@@ -212,7 +216,7 @@
           <a:p>
             <a:fld id="{364BA545-4274-4580-A00D-7F22990E525F}" type="datetimeFigureOut">
               <a:rPr lang="en-US" smtClean="0"/>
-              <a:t>10/16/2018</a:t>
+              <a:t>10/21/2018</a:t>
             </a:fld>
             <a:endParaRPr lang="en-US"/>
           </a:p>
@@ -666,7 +670,7 @@
           <a:p>
             <a:fld id="{18240E93-516D-40B8-B139-20F636283E8B}" type="datetime1">
               <a:rPr lang="en-US" smtClean="0"/>
-              <a:t>10/16/2018</a:t>
+              <a:t>10/21/2018</a:t>
             </a:fld>
             <a:endParaRPr lang="en-US" dirty="0"/>
           </a:p>
@@ -941,7 +945,7 @@
           <a:p>
             <a:fld id="{C8556125-56ED-41FE-BA0A-EB5E20EBA4FD}" type="datetime1">
               <a:rPr lang="en-US" smtClean="0"/>
-              <a:t>10/16/2018</a:t>
+              <a:t>10/21/2018</a:t>
             </a:fld>
             <a:endParaRPr lang="en-US" dirty="0"/>
           </a:p>
@@ -1135,7 +1139,7 @@
           <a:p>
             <a:fld id="{F8615742-BF0D-4B00-81C8-1B769A8D80C0}" type="datetime1">
               <a:rPr lang="en-US" smtClean="0"/>
-              <a:t>10/16/2018</a:t>
+              <a:t>10/21/2018</a:t>
             </a:fld>
             <a:endParaRPr lang="en-US" dirty="0"/>
           </a:p>
@@ -1406,7 +1410,7 @@
           <a:p>
             <a:fld id="{C25C919B-6A7C-42AB-BB75-1A29578BAA9F}" type="datetime1">
               <a:rPr lang="en-US" smtClean="0"/>
-              <a:t>10/16/2018</a:t>
+              <a:t>10/21/2018</a:t>
             </a:fld>
             <a:endParaRPr lang="en-US" dirty="0"/>
           </a:p>
@@ -1733,7 +1737,7 @@
           <a:p>
             <a:fld id="{8434AC9C-CC5C-4ED1-B4B5-33129B08BBBA}" type="datetime1">
               <a:rPr lang="en-US" smtClean="0"/>
-              <a:t>10/16/2018</a:t>
+              <a:t>10/21/2018</a:t>
             </a:fld>
             <a:endParaRPr lang="en-US" dirty="0"/>
           </a:p>
@@ -2352,7 +2356,7 @@
           <a:p>
             <a:fld id="{38FE29AB-C000-4944-963F-E7DD7A654521}" type="datetime1">
               <a:rPr lang="en-US" smtClean="0"/>
-              <a:t>10/16/2018</a:t>
+              <a:t>10/21/2018</a:t>
             </a:fld>
             <a:endParaRPr lang="en-US" dirty="0"/>
           </a:p>
@@ -3199,7 +3203,7 @@
           <a:p>
             <a:fld id="{CB231152-C398-4931-841D-7D39DC38F364}" type="datetime1">
               <a:rPr lang="en-US" smtClean="0"/>
-              <a:t>10/16/2018</a:t>
+              <a:t>10/21/2018</a:t>
             </a:fld>
             <a:endParaRPr lang="en-US" dirty="0"/>
           </a:p>
@@ -3369,7 +3373,7 @@
           <a:p>
             <a:fld id="{10F3B4FB-2BE9-4614-9B72-91ADABA8A638}" type="datetime1">
               <a:rPr lang="en-US" smtClean="0"/>
-              <a:t>10/16/2018</a:t>
+              <a:t>10/21/2018</a:t>
             </a:fld>
             <a:endParaRPr lang="en-US" dirty="0"/>
           </a:p>
@@ -3549,7 +3553,7 @@
           <a:p>
             <a:fld id="{53653793-09CA-4CE8-B4C8-E10AE1E56952}" type="datetime1">
               <a:rPr lang="en-US" smtClean="0"/>
-              <a:t>10/16/2018</a:t>
+              <a:t>10/21/2018</a:t>
             </a:fld>
             <a:endParaRPr lang="en-US" dirty="0"/>
           </a:p>
@@ -3719,7 +3723,7 @@
           <a:p>
             <a:fld id="{ED268B33-8C23-4F5B-80BE-4108A7E7657E}" type="datetime1">
               <a:rPr lang="en-US" smtClean="0"/>
-              <a:t>10/16/2018</a:t>
+              <a:t>10/21/2018</a:t>
             </a:fld>
             <a:endParaRPr lang="en-US" dirty="0"/>
           </a:p>
@@ -3966,7 +3970,7 @@
           <a:p>
             <a:fld id="{DE586C82-492C-434B-B4D7-B1050DA55AA4}" type="datetime1">
               <a:rPr lang="en-US" smtClean="0"/>
-              <a:t>10/16/2018</a:t>
+              <a:t>10/21/2018</a:t>
             </a:fld>
             <a:endParaRPr lang="en-US" dirty="0"/>
           </a:p>
@@ -4258,7 +4262,7 @@
           <a:p>
             <a:fld id="{3AB3996E-FE57-49A2-80AA-C383DFF3E585}" type="datetime1">
               <a:rPr lang="en-US" smtClean="0"/>
-              <a:t>10/16/2018</a:t>
+              <a:t>10/21/2018</a:t>
             </a:fld>
             <a:endParaRPr lang="en-US" dirty="0"/>
           </a:p>
@@ -4702,7 +4706,7 @@
           <a:p>
             <a:fld id="{F92270C7-0C51-4E76-B7E6-509136AB5CEE}" type="datetime1">
               <a:rPr lang="en-US" smtClean="0"/>
-              <a:t>10/16/2018</a:t>
+              <a:t>10/21/2018</a:t>
             </a:fld>
             <a:endParaRPr lang="en-US" dirty="0"/>
           </a:p>
@@ -4820,7 +4824,7 @@
           <a:p>
             <a:fld id="{62B315EF-EBCC-497D-A507-F995E8087569}" type="datetime1">
               <a:rPr lang="en-US" smtClean="0"/>
-              <a:t>10/16/2018</a:t>
+              <a:t>10/21/2018</a:t>
             </a:fld>
             <a:endParaRPr lang="en-US" dirty="0"/>
           </a:p>
@@ -4915,7 +4919,7 @@
           <a:p>
             <a:fld id="{924BB917-3353-4C0E-AA1E-F84C4EEAF305}" type="datetime1">
               <a:rPr lang="en-US" smtClean="0"/>
-              <a:t>10/16/2018</a:t>
+              <a:t>10/21/2018</a:t>
             </a:fld>
             <a:endParaRPr lang="en-US" dirty="0"/>
           </a:p>
@@ -5194,7 +5198,7 @@
           <a:p>
             <a:fld id="{C40DFD47-544D-438F-A7C5-49AE9DB07ED3}" type="datetime1">
               <a:rPr lang="en-US" smtClean="0"/>
-              <a:t>10/16/2018</a:t>
+              <a:t>10/21/2018</a:t>
             </a:fld>
             <a:endParaRPr lang="en-US" dirty="0"/>
           </a:p>
@@ -5469,7 +5473,7 @@
           <a:p>
             <a:fld id="{59E1E701-5A8A-4183-ADAD-141EC69014C3}" type="datetime1">
               <a:rPr lang="en-US" smtClean="0"/>
-              <a:t>10/16/2018</a:t>
+              <a:t>10/21/2018</a:t>
             </a:fld>
             <a:endParaRPr lang="en-US" dirty="0"/>
           </a:p>
@@ -5892,7 +5896,7 @@
           <a:p>
             <a:fld id="{D0F7FB31-245E-4B65-AB56-E0546830EB8F}" type="datetime1">
               <a:rPr lang="en-US" smtClean="0"/>
-              <a:t>10/16/2018</a:t>
+              <a:t>10/21/2018</a:t>
             </a:fld>
             <a:endParaRPr lang="en-US" dirty="0"/>
           </a:p>
@@ -6813,6 +6817,89 @@
           <a:p>
             <a:pPr algn="ctr"/>
             <a:r>
+              <a:rPr lang="en-US" dirty="0" smtClean="0"/>
+              <a:t>9 Steps result</a:t>
+            </a:r>
+            <a:endParaRPr lang="en-US" dirty="0"/>
+          </a:p>
+        </p:txBody>
+      </p:sp>
+      <p:pic>
+        <p:nvPicPr>
+          <p:cNvPr id="4" name="Content Placeholder 3" descr="Screen Clipping"/>
+          <p:cNvPicPr>
+            <a:picLocks noGrp="1" noChangeAspect="1"/>
+          </p:cNvPicPr>
+          <p:nvPr>
+            <p:ph idx="1"/>
+          </p:nvPr>
+        </p:nvPicPr>
+        <p:blipFill>
+          <a:blip r:embed="rId2">
+            <a:extLst>
+              <a:ext uri="{28A0092B-C50C-407E-A947-70E740481C1C}">
+                <a14:useLocalDpi xmlns:a14="http://schemas.microsoft.com/office/drawing/2010/main" val="0"/>
+              </a:ext>
+            </a:extLst>
+          </a:blip>
+          <a:stretch>
+            <a:fillRect/>
+          </a:stretch>
+        </p:blipFill>
+        <p:spPr>
+          <a:xfrm>
+            <a:off x="142268" y="2580568"/>
+            <a:ext cx="11934805" cy="3421222"/>
+          </a:xfrm>
+        </p:spPr>
+      </p:pic>
+    </p:spTree>
+    <p:extLst>
+      <p:ext uri="{BB962C8B-B14F-4D97-AF65-F5344CB8AC3E}">
+        <p14:creationId xmlns:p14="http://schemas.microsoft.com/office/powerpoint/2010/main" val="607266327"/>
+      </p:ext>
+    </p:extLst>
+  </p:cSld>
+  <p:clrMapOvr>
+    <a:masterClrMapping/>
+  </p:clrMapOvr>
+</p:sld>
+</file>
+
+<file path=ppt/slides/slide11.xml><?xml version="1.0" encoding="utf-8"?>
+<p:sld xmlns:a="http://schemas.openxmlformats.org/drawingml/2006/main" xmlns:r="http://schemas.openxmlformats.org/officeDocument/2006/relationships" xmlns:p="http://schemas.openxmlformats.org/presentationml/2006/main">
+  <p:cSld>
+    <p:spTree>
+      <p:nvGrpSpPr>
+        <p:cNvPr id="1" name=""/>
+        <p:cNvGrpSpPr/>
+        <p:nvPr/>
+      </p:nvGrpSpPr>
+      <p:grpSpPr>
+        <a:xfrm>
+          <a:off x="0" y="0"/>
+          <a:ext cx="0" cy="0"/>
+          <a:chOff x="0" y="0"/>
+          <a:chExt cx="0" cy="0"/>
+        </a:xfrm>
+      </p:grpSpPr>
+      <p:sp>
+        <p:nvSpPr>
+          <p:cNvPr id="2" name="Title 1"/>
+          <p:cNvSpPr>
+            <a:spLocks noGrp="1"/>
+          </p:cNvSpPr>
+          <p:nvPr>
+            <p:ph type="title"/>
+          </p:nvPr>
+        </p:nvSpPr>
+        <p:spPr/>
+        <p:txBody>
+          <a:bodyPr/>
+          <a:lstStyle/>
+          <a:p>
+            <a:pPr algn="ctr"/>
+            <a:r>
               <a:rPr lang="en-US" dirty="0" smtClean="0">
                 <a:latin typeface="Berlin Sans FB" panose="020E0602020502020306" pitchFamily="34" charset="0"/>
               </a:rPr>
@@ -6907,7 +6994,7 @@
 </p:sld>
 </file>
 
-<file path=ppt/slides/slide11.xml><?xml version="1.0" encoding="utf-8"?>
+<file path=ppt/slides/slide12.xml><?xml version="1.0" encoding="utf-8"?>
 <p:sld xmlns:a="http://schemas.openxmlformats.org/drawingml/2006/main" xmlns:r="http://schemas.openxmlformats.org/officeDocument/2006/relationships" xmlns:p="http://schemas.openxmlformats.org/presentationml/2006/main">
   <p:cSld>
     <p:spTree>
@@ -6950,7 +7037,7 @@
       </p:sp>
       <p:pic>
         <p:nvPicPr>
-          <p:cNvPr id="4" name="Content Placeholder 3" descr="Screen Clipping"/>
+          <p:cNvPr id="6" name="Content Placeholder 5" descr="Screen Clipping"/>
           <p:cNvPicPr>
             <a:picLocks noGrp="1" noChangeAspect="1"/>
           </p:cNvPicPr>
@@ -6972,9 +7059,526 @@
         </p:blipFill>
         <p:spPr>
           <a:xfrm>
-            <a:off x="1369318" y="1152983"/>
-            <a:ext cx="7471901" cy="4175912"/>
-          </a:xfrm>
+            <a:off x="787430" y="1337836"/>
+            <a:ext cx="8947150" cy="4079199"/>
+          </a:xfrm>
+        </p:spPr>
+      </p:pic>
+      <p:pic>
+        <p:nvPicPr>
+          <p:cNvPr id="7" name="Picture 6" descr="Screen Clipping"/>
+          <p:cNvPicPr>
+            <a:picLocks noChangeAspect="1"/>
+          </p:cNvPicPr>
+          <p:nvPr/>
+        </p:nvPicPr>
+        <p:blipFill>
+          <a:blip r:embed="rId3">
+            <a:extLst>
+              <a:ext uri="{28A0092B-C50C-407E-A947-70E740481C1C}">
+                <a14:useLocalDpi xmlns:a14="http://schemas.microsoft.com/office/drawing/2010/main" val="0"/>
+              </a:ext>
+            </a:extLst>
+          </a:blip>
+          <a:stretch>
+            <a:fillRect/>
+          </a:stretch>
+        </p:blipFill>
+        <p:spPr>
+          <a:xfrm>
+            <a:off x="1345684" y="5810383"/>
+            <a:ext cx="3915321" cy="590632"/>
+          </a:xfrm>
+          <a:prstGeom prst="rect">
+            <a:avLst/>
+          </a:prstGeom>
+        </p:spPr>
+      </p:pic>
+    </p:spTree>
+    <p:extLst>
+      <p:ext uri="{BB962C8B-B14F-4D97-AF65-F5344CB8AC3E}">
+        <p14:creationId xmlns:p14="http://schemas.microsoft.com/office/powerpoint/2010/main" val="3952028801"/>
+      </p:ext>
+    </p:extLst>
+  </p:cSld>
+  <p:clrMapOvr>
+    <a:masterClrMapping/>
+  </p:clrMapOvr>
+</p:sld>
+</file>
+
+<file path=ppt/slides/slide13.xml><?xml version="1.0" encoding="utf-8"?>
+<p:sld xmlns:a="http://schemas.openxmlformats.org/drawingml/2006/main" xmlns:r="http://schemas.openxmlformats.org/officeDocument/2006/relationships" xmlns:p="http://schemas.openxmlformats.org/presentationml/2006/main">
+  <p:cSld>
+    <p:spTree>
+      <p:nvGrpSpPr>
+        <p:cNvPr id="1" name=""/>
+        <p:cNvGrpSpPr/>
+        <p:nvPr/>
+      </p:nvGrpSpPr>
+      <p:grpSpPr>
+        <a:xfrm>
+          <a:off x="0" y="0"/>
+          <a:ext cx="0" cy="0"/>
+          <a:chOff x="0" y="0"/>
+          <a:chExt cx="0" cy="0"/>
+        </a:xfrm>
+      </p:grpSpPr>
+      <p:sp>
+        <p:nvSpPr>
+          <p:cNvPr id="2" name="Title 1"/>
+          <p:cNvSpPr>
+            <a:spLocks noGrp="1"/>
+          </p:cNvSpPr>
+          <p:nvPr>
+            <p:ph type="title"/>
+          </p:nvPr>
+        </p:nvSpPr>
+        <p:spPr/>
+        <p:txBody>
+          <a:bodyPr/>
+          <a:lstStyle/>
+          <a:p>
+            <a:pPr algn="ctr"/>
+            <a:r>
+              <a:rPr lang="en-US" dirty="0" smtClean="0">
+                <a:latin typeface="Berlin Sans FB" panose="020E0602020502020306" pitchFamily="34" charset="0"/>
+              </a:rPr>
+              <a:t>Step 3: Median </a:t>
+            </a:r>
+            <a:r>
+              <a:rPr lang="en-US" dirty="0">
+                <a:latin typeface="Berlin Sans FB" panose="020E0602020502020306" pitchFamily="34" charset="0"/>
+              </a:rPr>
+              <a:t>signal pattern </a:t>
+            </a:r>
+          </a:p>
+        </p:txBody>
+      </p:sp>
+      <p:sp>
+        <p:nvSpPr>
+          <p:cNvPr id="3" name="Content Placeholder 2"/>
+          <p:cNvSpPr>
+            <a:spLocks noGrp="1"/>
+          </p:cNvSpPr>
+          <p:nvPr>
+            <p:ph idx="1"/>
+          </p:nvPr>
+        </p:nvSpPr>
+        <p:spPr>
+          <a:xfrm>
+            <a:off x="1138844" y="1224282"/>
+            <a:ext cx="8911990" cy="5400961"/>
+          </a:xfrm>
+        </p:spPr>
+        <p:txBody>
+          <a:bodyPr>
+            <a:normAutofit fontScale="92500" lnSpcReduction="10000"/>
+          </a:bodyPr>
+          <a:lstStyle/>
+          <a:p>
+            <a:r>
+              <a:rPr lang="en-US" dirty="0" smtClean="0">
+                <a:latin typeface="Berlin Sans FB" panose="020E0602020502020306" pitchFamily="34" charset="0"/>
+              </a:rPr>
+              <a:t>I used medfilt1() function on </a:t>
+            </a:r>
+            <a:r>
+              <a:rPr lang="en-US" dirty="0">
+                <a:latin typeface="Berlin Sans FB" panose="020E0602020502020306" pitchFamily="34" charset="0"/>
+              </a:rPr>
+              <a:t>each one of </a:t>
+            </a:r>
+            <a:r>
+              <a:rPr lang="en-US" dirty="0" smtClean="0">
+                <a:latin typeface="Berlin Sans FB" panose="020E0602020502020306" pitchFamily="34" charset="0"/>
+              </a:rPr>
+              <a:t>steps in the matrix </a:t>
+            </a:r>
+            <a:r>
+              <a:rPr lang="en-US" dirty="0" smtClean="0">
+                <a:latin typeface="Berlin Sans FB" panose="020E0602020502020306" pitchFamily="34" charset="0"/>
+              </a:rPr>
+              <a:t>I </a:t>
+            </a:r>
+            <a:r>
+              <a:rPr lang="en-US" dirty="0" smtClean="0">
+                <a:latin typeface="Berlin Sans FB" panose="020E0602020502020306" pitchFamily="34" charset="0"/>
+              </a:rPr>
+              <a:t>got after removing the abnormal </a:t>
+            </a:r>
+            <a:r>
+              <a:rPr lang="en-US" dirty="0" smtClean="0">
+                <a:latin typeface="Berlin Sans FB" panose="020E0602020502020306" pitchFamily="34" charset="0"/>
+              </a:rPr>
+              <a:t>ones, to create this pattern(orange):</a:t>
+            </a:r>
+          </a:p>
+          <a:p>
+            <a:endParaRPr lang="en-US" dirty="0">
+              <a:latin typeface="Berlin Sans FB" panose="020E0602020502020306" pitchFamily="34" charset="0"/>
+            </a:endParaRPr>
+          </a:p>
+          <a:p>
+            <a:endParaRPr lang="en-US" dirty="0">
+              <a:latin typeface="Berlin Sans FB" panose="020E0602020502020306" pitchFamily="34" charset="0"/>
+            </a:endParaRPr>
+          </a:p>
+          <a:p>
+            <a:pPr marL="0" indent="0">
+              <a:buNone/>
+            </a:pPr>
+            <a:endParaRPr lang="en-US" dirty="0" smtClean="0">
+              <a:latin typeface="Berlin Sans FB" panose="020E0602020502020306" pitchFamily="34" charset="0"/>
+            </a:endParaRPr>
+          </a:p>
+          <a:p>
+            <a:endParaRPr lang="en-US" dirty="0">
+              <a:latin typeface="Berlin Sans FB" panose="020E0602020502020306" pitchFamily="34" charset="0"/>
+            </a:endParaRPr>
+          </a:p>
+          <a:p>
+            <a:pPr marL="0" indent="0">
+              <a:buNone/>
+            </a:pPr>
+            <a:endParaRPr lang="en-US" dirty="0">
+              <a:latin typeface="Berlin Sans FB" panose="020E0602020502020306" pitchFamily="34" charset="0"/>
+            </a:endParaRPr>
+          </a:p>
+          <a:p>
+            <a:pPr marL="0" indent="0">
+              <a:buNone/>
+            </a:pPr>
+            <a:endParaRPr lang="en-US" dirty="0" smtClean="0">
+              <a:latin typeface="Berlin Sans FB" panose="020E0602020502020306" pitchFamily="34" charset="0"/>
+            </a:endParaRPr>
+          </a:p>
+          <a:p>
+            <a:endParaRPr lang="en-US" dirty="0" smtClean="0">
+              <a:latin typeface="Berlin Sans FB" panose="020E0602020502020306" pitchFamily="34" charset="0"/>
+            </a:endParaRPr>
+          </a:p>
+          <a:p>
+            <a:endParaRPr lang="en-US" dirty="0">
+              <a:latin typeface="Berlin Sans FB" panose="020E0602020502020306" pitchFamily="34" charset="0"/>
+            </a:endParaRPr>
+          </a:p>
+          <a:p>
+            <a:endParaRPr lang="en-US" dirty="0" smtClean="0">
+              <a:latin typeface="Berlin Sans FB" panose="020E0602020502020306" pitchFamily="34" charset="0"/>
+            </a:endParaRPr>
+          </a:p>
+          <a:p>
+            <a:endParaRPr lang="en-US" dirty="0" smtClean="0">
+              <a:latin typeface="Berlin Sans FB" panose="020E0602020502020306" pitchFamily="34" charset="0"/>
+            </a:endParaRPr>
+          </a:p>
+          <a:p>
+            <a:endParaRPr lang="en-US" dirty="0">
+              <a:latin typeface="Berlin Sans FB" panose="020E0602020502020306" pitchFamily="34" charset="0"/>
+            </a:endParaRPr>
+          </a:p>
+          <a:p>
+            <a:r>
+              <a:rPr lang="en-US" dirty="0" smtClean="0">
+                <a:latin typeface="Berlin Sans FB" panose="020E0602020502020306" pitchFamily="34" charset="0"/>
+              </a:rPr>
+              <a:t>Example:</a:t>
+            </a:r>
+            <a:endParaRPr lang="en-US" dirty="0">
+              <a:latin typeface="Berlin Sans FB" panose="020E0602020502020306" pitchFamily="34" charset="0"/>
+            </a:endParaRPr>
+          </a:p>
+        </p:txBody>
+      </p:sp>
+      <p:pic>
+        <p:nvPicPr>
+          <p:cNvPr id="5" name="Picture 4" descr="Screen Clipping"/>
+          <p:cNvPicPr>
+            <a:picLocks noChangeAspect="1"/>
+          </p:cNvPicPr>
+          <p:nvPr/>
+        </p:nvPicPr>
+        <p:blipFill>
+          <a:blip r:embed="rId2">
+            <a:extLst>
+              <a:ext uri="{28A0092B-C50C-407E-A947-70E740481C1C}">
+                <a14:useLocalDpi xmlns:a14="http://schemas.microsoft.com/office/drawing/2010/main" val="0"/>
+              </a:ext>
+            </a:extLst>
+          </a:blip>
+          <a:stretch>
+            <a:fillRect/>
+          </a:stretch>
+        </p:blipFill>
+        <p:spPr>
+          <a:xfrm>
+            <a:off x="556185" y="1853248"/>
+            <a:ext cx="7565350" cy="4260783"/>
+          </a:xfrm>
+          <a:prstGeom prst="rect">
+            <a:avLst/>
+          </a:prstGeom>
+        </p:spPr>
+      </p:pic>
+      <p:pic>
+        <p:nvPicPr>
+          <p:cNvPr id="6" name="Picture 5" descr="Screen Clipping"/>
+          <p:cNvPicPr>
+            <a:picLocks noChangeAspect="1"/>
+          </p:cNvPicPr>
+          <p:nvPr/>
+        </p:nvPicPr>
+        <p:blipFill>
+          <a:blip r:embed="rId3">
+            <a:extLst>
+              <a:ext uri="{28A0092B-C50C-407E-A947-70E740481C1C}">
+                <a14:useLocalDpi xmlns:a14="http://schemas.microsoft.com/office/drawing/2010/main" val="0"/>
+              </a:ext>
+            </a:extLst>
+          </a:blip>
+          <a:stretch>
+            <a:fillRect/>
+          </a:stretch>
+        </p:blipFill>
+        <p:spPr>
+          <a:xfrm>
+            <a:off x="8558164" y="2925035"/>
+            <a:ext cx="3172268" cy="3801005"/>
+          </a:xfrm>
+          <a:prstGeom prst="rect">
+            <a:avLst/>
+          </a:prstGeom>
+        </p:spPr>
+      </p:pic>
+    </p:spTree>
+    <p:extLst>
+      <p:ext uri="{BB962C8B-B14F-4D97-AF65-F5344CB8AC3E}">
+        <p14:creationId xmlns:p14="http://schemas.microsoft.com/office/powerpoint/2010/main" val="3183780647"/>
+      </p:ext>
+    </p:extLst>
+  </p:cSld>
+  <p:clrMapOvr>
+    <a:masterClrMapping/>
+  </p:clrMapOvr>
+  <p:timing>
+    <p:tnLst>
+      <p:par>
+        <p:cTn id="1" dur="indefinite" restart="never" nodeType="tmRoot"/>
+      </p:par>
+    </p:tnLst>
+  </p:timing>
+</p:sld>
+</file>
+
+<file path=ppt/slides/slide14.xml><?xml version="1.0" encoding="utf-8"?>
+<p:sld xmlns:a="http://schemas.openxmlformats.org/drawingml/2006/main" xmlns:r="http://schemas.openxmlformats.org/officeDocument/2006/relationships" xmlns:p="http://schemas.openxmlformats.org/presentationml/2006/main">
+  <p:cSld>
+    <p:spTree>
+      <p:nvGrpSpPr>
+        <p:cNvPr id="1" name=""/>
+        <p:cNvGrpSpPr/>
+        <p:nvPr/>
+      </p:nvGrpSpPr>
+      <p:grpSpPr>
+        <a:xfrm>
+          <a:off x="0" y="0"/>
+          <a:ext cx="0" cy="0"/>
+          <a:chOff x="0" y="0"/>
+          <a:chExt cx="0" cy="0"/>
+        </a:xfrm>
+      </p:grpSpPr>
+      <p:sp>
+        <p:nvSpPr>
+          <p:cNvPr id="2" name="Title 1"/>
+          <p:cNvSpPr>
+            <a:spLocks noGrp="1"/>
+          </p:cNvSpPr>
+          <p:nvPr>
+            <p:ph type="title"/>
+          </p:nvPr>
+        </p:nvSpPr>
+        <p:spPr>
+          <a:xfrm>
+            <a:off x="646111" y="282848"/>
+            <a:ext cx="9404723" cy="1400530"/>
+          </a:xfrm>
+        </p:spPr>
+        <p:txBody>
+          <a:bodyPr/>
+          <a:lstStyle/>
+          <a:p>
+            <a:pPr algn="ctr"/>
+            <a:r>
+              <a:rPr lang="en-US" dirty="0" smtClean="0">
+                <a:latin typeface="Berlin Sans FB" panose="020E0602020502020306" pitchFamily="34" charset="0"/>
+              </a:rPr>
+              <a:t>Step 4:Calculating </a:t>
+            </a:r>
+            <a:r>
+              <a:rPr lang="en-US" dirty="0">
+                <a:latin typeface="Berlin Sans FB" panose="020E0602020502020306" pitchFamily="34" charset="0"/>
+              </a:rPr>
+              <a:t>Percentiles</a:t>
+            </a:r>
+            <a:r>
+              <a:rPr lang="en-US" dirty="0"/>
+              <a:t> </a:t>
+            </a:r>
+          </a:p>
+        </p:txBody>
+      </p:sp>
+      <p:sp>
+        <p:nvSpPr>
+          <p:cNvPr id="3" name="Content Placeholder 2"/>
+          <p:cNvSpPr>
+            <a:spLocks noGrp="1"/>
+          </p:cNvSpPr>
+          <p:nvPr>
+            <p:ph idx="1"/>
+          </p:nvPr>
+        </p:nvSpPr>
+        <p:spPr>
+          <a:xfrm>
+            <a:off x="1104293" y="1180407"/>
+            <a:ext cx="8946541" cy="4959926"/>
+          </a:xfrm>
+        </p:spPr>
+        <p:txBody>
+          <a:bodyPr/>
+          <a:lstStyle/>
+          <a:p>
+            <a:r>
+              <a:rPr lang="en-US" dirty="0" smtClean="0">
+                <a:latin typeface="Berlin Sans FB" panose="020E0602020502020306" pitchFamily="34" charset="0"/>
+              </a:rPr>
+              <a:t>What is a Percentile?</a:t>
+            </a:r>
+          </a:p>
+          <a:p>
+            <a:pPr marL="0" indent="0">
+              <a:buNone/>
+            </a:pPr>
+            <a:r>
+              <a:rPr lang="en-US" dirty="0" smtClean="0">
+                <a:latin typeface="Berlin Sans FB" panose="020E0602020502020306" pitchFamily="34" charset="0"/>
+              </a:rPr>
+              <a:t>Percentile is a value below which a certain percentage of observations lie.</a:t>
+            </a:r>
+          </a:p>
+          <a:p>
+            <a:pPr marL="0" indent="0">
+              <a:buNone/>
+            </a:pPr>
+            <a:r>
+              <a:rPr lang="en-US" dirty="0" smtClean="0">
+                <a:latin typeface="Berlin Sans FB" panose="020E0602020502020306" pitchFamily="34" charset="0"/>
+              </a:rPr>
+              <a:t>Percentile 10 is a number that under it there are 10% of the samples in the data.</a:t>
+            </a:r>
+          </a:p>
+          <a:p>
+            <a:pPr marL="0" indent="0">
+              <a:buNone/>
+            </a:pPr>
+            <a:r>
+              <a:rPr lang="en-US" dirty="0" smtClean="0">
+                <a:latin typeface="Berlin Sans FB" panose="020E0602020502020306" pitchFamily="34" charset="0"/>
+              </a:rPr>
+              <a:t>It doesn’t have to be one of the data samples(like in this case).</a:t>
+            </a:r>
+          </a:p>
+          <a:p>
+            <a:r>
+              <a:rPr lang="en-US" dirty="0" smtClean="0">
+                <a:latin typeface="Berlin Sans FB" panose="020E0602020502020306" pitchFamily="34" charset="0"/>
+              </a:rPr>
+              <a:t>Prctile is a Matlab</a:t>
+            </a:r>
+            <a:r>
+              <a:rPr lang="en-US" dirty="0">
+                <a:latin typeface="Berlin Sans FB" panose="020E0602020502020306" pitchFamily="34" charset="0"/>
+              </a:rPr>
+              <a:t> </a:t>
+            </a:r>
+            <a:r>
+              <a:rPr lang="en-US" dirty="0" smtClean="0">
+                <a:latin typeface="Berlin Sans FB" panose="020E0602020502020306" pitchFamily="34" charset="0"/>
+              </a:rPr>
+              <a:t>Built-in Function:</a:t>
+            </a:r>
+            <a:endParaRPr lang="en-US" dirty="0">
+              <a:latin typeface="Berlin Sans FB" panose="020E0602020502020306" pitchFamily="34" charset="0"/>
+            </a:endParaRPr>
+          </a:p>
+          <a:p>
+            <a:endParaRPr lang="en-US" dirty="0" smtClean="0">
+              <a:latin typeface="Berlin Sans FB" panose="020E0602020502020306" pitchFamily="34" charset="0"/>
+            </a:endParaRPr>
+          </a:p>
+          <a:p>
+            <a:endParaRPr lang="en-US" dirty="0">
+              <a:latin typeface="Berlin Sans FB" panose="020E0602020502020306" pitchFamily="34" charset="0"/>
+            </a:endParaRPr>
+          </a:p>
+          <a:p>
+            <a:r>
+              <a:rPr lang="en-US" dirty="0" smtClean="0">
+                <a:latin typeface="Berlin Sans FB" panose="020E0602020502020306" pitchFamily="34" charset="0"/>
+              </a:rPr>
+              <a:t>I Used it with values 10 and </a:t>
+            </a:r>
+            <a:r>
+              <a:rPr lang="en-US" dirty="0" smtClean="0">
+                <a:latin typeface="Berlin Sans FB" panose="020E0602020502020306" pitchFamily="34" charset="0"/>
+              </a:rPr>
+              <a:t>90 and added a condition to </a:t>
+            </a:r>
+          </a:p>
+          <a:p>
+            <a:pPr marL="0" indent="0">
+              <a:buNone/>
+            </a:pPr>
+            <a:r>
+              <a:rPr lang="en-US" dirty="0" smtClean="0">
+                <a:latin typeface="Berlin Sans FB" panose="020E0602020502020306" pitchFamily="34" charset="0"/>
+              </a:rPr>
+              <a:t>get all the numbers that are under this percentile:</a:t>
+            </a:r>
+            <a:endParaRPr lang="en-US" dirty="0">
+              <a:latin typeface="Berlin Sans FB" panose="020E0602020502020306" pitchFamily="34" charset="0"/>
+            </a:endParaRPr>
+          </a:p>
+        </p:txBody>
+      </p:sp>
+      <p:pic>
+        <p:nvPicPr>
+          <p:cNvPr id="4" name="Picture 3" descr="Screen Clipping"/>
+          <p:cNvPicPr>
+            <a:picLocks noChangeAspect="1"/>
+          </p:cNvPicPr>
+          <p:nvPr/>
+        </p:nvPicPr>
+        <p:blipFill>
+          <a:blip r:embed="rId2">
+            <a:extLst>
+              <a:ext uri="{28A0092B-C50C-407E-A947-70E740481C1C}">
+                <a14:useLocalDpi xmlns:a14="http://schemas.microsoft.com/office/drawing/2010/main" val="0"/>
+              </a:ext>
+            </a:extLst>
+          </a:blip>
+          <a:stretch>
+            <a:fillRect/>
+          </a:stretch>
+        </p:blipFill>
+        <p:spPr>
+          <a:xfrm>
+            <a:off x="1451776" y="3432273"/>
+            <a:ext cx="5048955" cy="752580"/>
+          </a:xfrm>
+          <a:prstGeom prst="rect">
+            <a:avLst/>
+          </a:prstGeom>
         </p:spPr>
       </p:pic>
       <p:pic>
@@ -6999,8 +7603,8 @@
         </p:blipFill>
         <p:spPr>
           <a:xfrm>
-            <a:off x="1369318" y="5620376"/>
-            <a:ext cx="4810796" cy="1066949"/>
+            <a:off x="8345154" y="2751513"/>
+            <a:ext cx="3580339" cy="3861763"/>
           </a:xfrm>
           <a:prstGeom prst="rect">
             <a:avLst/>
@@ -7010,7 +7614,7 @@
     </p:spTree>
     <p:extLst>
       <p:ext uri="{BB962C8B-B14F-4D97-AF65-F5344CB8AC3E}">
-        <p14:creationId xmlns:p14="http://schemas.microsoft.com/office/powerpoint/2010/main" val="3952028801"/>
+        <p14:creationId xmlns:p14="http://schemas.microsoft.com/office/powerpoint/2010/main" val="544535038"/>
       </p:ext>
     </p:extLst>
   </p:cSld>
@@ -7020,7 +7624,7 @@
 </p:sld>
 </file>
 
-<file path=ppt/slides/slide12.xml><?xml version="1.0" encoding="utf-8"?>
+<file path=ppt/slides/slide15.xml><?xml version="1.0" encoding="utf-8"?>
 <p:sld xmlns:a="http://schemas.openxmlformats.org/drawingml/2006/main" xmlns:r="http://schemas.openxmlformats.org/officeDocument/2006/relationships" xmlns:p="http://schemas.openxmlformats.org/presentationml/2006/main">
   <p:cSld>
     <p:spTree>
@@ -7047,123 +7651,28 @@
             <p:ph type="title"/>
           </p:nvPr>
         </p:nvSpPr>
-        <p:spPr/>
+        <p:spPr>
+          <a:xfrm>
+            <a:off x="862242" y="427780"/>
+            <a:ext cx="9404723" cy="1400530"/>
+          </a:xfrm>
+        </p:spPr>
         <p:txBody>
           <a:bodyPr/>
           <a:lstStyle/>
           <a:p>
             <a:pPr algn="ctr"/>
             <a:r>
-              <a:rPr lang="en-US" dirty="0" smtClean="0">
-                <a:latin typeface="Berlin Sans FB" panose="020E0602020502020306" pitchFamily="34" charset="0"/>
-              </a:rPr>
-              <a:t>Step 3: Median </a:t>
-            </a:r>
-            <a:r>
-              <a:rPr lang="en-US" dirty="0">
-                <a:latin typeface="Berlin Sans FB" panose="020E0602020502020306" pitchFamily="34" charset="0"/>
-              </a:rPr>
-              <a:t>signal pattern </a:t>
-            </a:r>
-          </a:p>
-        </p:txBody>
-      </p:sp>
-      <p:sp>
-        <p:nvSpPr>
-          <p:cNvPr id="3" name="Content Placeholder 2"/>
-          <p:cNvSpPr>
-            <a:spLocks noGrp="1"/>
-          </p:cNvSpPr>
-          <p:nvPr>
-            <p:ph idx="1"/>
-          </p:nvPr>
-        </p:nvSpPr>
-        <p:spPr>
-          <a:xfrm>
-            <a:off x="1187420" y="1412838"/>
-            <a:ext cx="8946541" cy="4195481"/>
-          </a:xfrm>
-        </p:spPr>
-        <p:txBody>
-          <a:bodyPr/>
-          <a:lstStyle/>
-          <a:p>
-            <a:r>
-              <a:rPr lang="en-US" dirty="0">
-                <a:latin typeface="Berlin Sans FB" panose="020E0602020502020306" pitchFamily="34" charset="0"/>
-              </a:rPr>
-              <a:t>We use median function(as practiced in lectures) on each one of </a:t>
-            </a:r>
-            <a:r>
-              <a:rPr lang="en-US" dirty="0" smtClean="0">
-                <a:latin typeface="Berlin Sans FB" panose="020E0602020502020306" pitchFamily="34" charset="0"/>
-              </a:rPr>
-              <a:t>steps in the matrix we got after removing the abnormal ones:</a:t>
-            </a:r>
-            <a:endParaRPr lang="en-US" dirty="0">
-              <a:latin typeface="Berlin Sans FB" panose="020E0602020502020306" pitchFamily="34" charset="0"/>
-            </a:endParaRPr>
-          </a:p>
-          <a:p>
-            <a:pPr marL="0" indent="0">
-              <a:buNone/>
-            </a:pPr>
-            <a:endParaRPr lang="en-US" dirty="0" smtClean="0">
-              <a:latin typeface="Berlin Sans FB" panose="020E0602020502020306" pitchFamily="34" charset="0"/>
-            </a:endParaRPr>
-          </a:p>
-          <a:p>
-            <a:endParaRPr lang="en-US" dirty="0">
-              <a:latin typeface="Berlin Sans FB" panose="020E0602020502020306" pitchFamily="34" charset="0"/>
-            </a:endParaRPr>
-          </a:p>
-          <a:p>
-            <a:pPr marL="0" indent="0">
-              <a:buNone/>
-            </a:pPr>
-            <a:endParaRPr lang="en-US" dirty="0">
-              <a:latin typeface="Berlin Sans FB" panose="020E0602020502020306" pitchFamily="34" charset="0"/>
-            </a:endParaRPr>
-          </a:p>
-          <a:p>
-            <a:pPr marL="0" indent="0">
-              <a:buNone/>
-            </a:pPr>
-            <a:endParaRPr lang="en-US" dirty="0" smtClean="0">
-              <a:latin typeface="Berlin Sans FB" panose="020E0602020502020306" pitchFamily="34" charset="0"/>
-            </a:endParaRPr>
-          </a:p>
-          <a:p>
-            <a:endParaRPr lang="en-US" dirty="0" smtClean="0">
-              <a:latin typeface="Berlin Sans FB" panose="020E0602020502020306" pitchFamily="34" charset="0"/>
-            </a:endParaRPr>
-          </a:p>
-          <a:p>
-            <a:endParaRPr lang="en-US" dirty="0">
-              <a:latin typeface="Berlin Sans FB" panose="020E0602020502020306" pitchFamily="34" charset="0"/>
-            </a:endParaRPr>
-          </a:p>
-          <a:p>
-            <a:endParaRPr lang="en-US" dirty="0" smtClean="0">
-              <a:latin typeface="Berlin Sans FB" panose="020E0602020502020306" pitchFamily="34" charset="0"/>
-            </a:endParaRPr>
-          </a:p>
-          <a:p>
-            <a:r>
-              <a:rPr lang="en-US" dirty="0" smtClean="0">
-                <a:latin typeface="Berlin Sans FB" panose="020E0602020502020306" pitchFamily="34" charset="0"/>
-              </a:rPr>
-              <a:t>Median Filter function:</a:t>
-            </a:r>
-            <a:endParaRPr lang="en-US" dirty="0">
-              <a:latin typeface="Berlin Sans FB" panose="020E0602020502020306" pitchFamily="34" charset="0"/>
-            </a:endParaRPr>
+              <a:rPr lang="en-US" dirty="0" smtClean="0"/>
+              <a:t>Result</a:t>
+            </a:r>
+            <a:endParaRPr lang="en-US" dirty="0"/>
           </a:p>
         </p:txBody>
       </p:sp>
       <p:pic>
         <p:nvPicPr>
-          <p:cNvPr id="8" name="Picture 7" descr="Screen Clipping"/>
+          <p:cNvPr id="6" name="Picture 5" descr="Screen Clipping"/>
           <p:cNvPicPr>
             <a:picLocks noChangeAspect="1"/>
           </p:cNvPicPr>
@@ -7183,38 +7692,8 @@
         </p:blipFill>
         <p:spPr>
           <a:xfrm>
-            <a:off x="7220116" y="1937320"/>
-            <a:ext cx="4152442" cy="4814425"/>
-          </a:xfrm>
-          <a:prstGeom prst="rect">
-            <a:avLst/>
-          </a:prstGeom>
-        </p:spPr>
-      </p:pic>
-      <p:pic>
-        <p:nvPicPr>
-          <p:cNvPr id="4" name="Picture 3" descr="Screen Clipping"/>
-          <p:cNvPicPr>
-            <a:picLocks noChangeAspect="1"/>
-          </p:cNvPicPr>
-          <p:nvPr/>
-        </p:nvPicPr>
-        <p:blipFill>
-          <a:blip r:embed="rId3">
-            <a:extLst>
-              <a:ext uri="{28A0092B-C50C-407E-A947-70E740481C1C}">
-                <a14:useLocalDpi xmlns:a14="http://schemas.microsoft.com/office/drawing/2010/main" val="0"/>
-              </a:ext>
-            </a:extLst>
-          </a:blip>
-          <a:stretch>
-            <a:fillRect/>
-          </a:stretch>
-        </p:blipFill>
-        <p:spPr>
-          <a:xfrm>
-            <a:off x="1576285" y="2210857"/>
-            <a:ext cx="4509194" cy="2785091"/>
+            <a:off x="490449" y="1128045"/>
+            <a:ext cx="10889675" cy="5478093"/>
           </a:xfrm>
           <a:prstGeom prst="rect">
             <a:avLst/>
@@ -7224,283 +7703,7 @@
     </p:spTree>
     <p:extLst>
       <p:ext uri="{BB962C8B-B14F-4D97-AF65-F5344CB8AC3E}">
-        <p14:creationId xmlns:p14="http://schemas.microsoft.com/office/powerpoint/2010/main" val="3183780647"/>
-      </p:ext>
-    </p:extLst>
-  </p:cSld>
-  <p:clrMapOvr>
-    <a:masterClrMapping/>
-  </p:clrMapOvr>
-  <p:timing>
-    <p:tnLst>
-      <p:par>
-        <p:cTn id="1" dur="indefinite" restart="never" nodeType="tmRoot"/>
-      </p:par>
-    </p:tnLst>
-  </p:timing>
-</p:sld>
-</file>
-
-<file path=ppt/slides/slide13.xml><?xml version="1.0" encoding="utf-8"?>
-<p:sld xmlns:a="http://schemas.openxmlformats.org/drawingml/2006/main" xmlns:r="http://schemas.openxmlformats.org/officeDocument/2006/relationships" xmlns:p="http://schemas.openxmlformats.org/presentationml/2006/main">
-  <p:cSld>
-    <p:spTree>
-      <p:nvGrpSpPr>
-        <p:cNvPr id="1" name=""/>
-        <p:cNvGrpSpPr/>
-        <p:nvPr/>
-      </p:nvGrpSpPr>
-      <p:grpSpPr>
-        <a:xfrm>
-          <a:off x="0" y="0"/>
-          <a:ext cx="0" cy="0"/>
-          <a:chOff x="0" y="0"/>
-          <a:chExt cx="0" cy="0"/>
-        </a:xfrm>
-      </p:grpSpPr>
-      <p:sp>
-        <p:nvSpPr>
-          <p:cNvPr id="2" name="Title 1"/>
-          <p:cNvSpPr>
-            <a:spLocks noGrp="1"/>
-          </p:cNvSpPr>
-          <p:nvPr>
-            <p:ph type="title"/>
-          </p:nvPr>
-        </p:nvSpPr>
-        <p:spPr>
-          <a:xfrm>
-            <a:off x="646111" y="282848"/>
-            <a:ext cx="9404723" cy="1400530"/>
-          </a:xfrm>
-        </p:spPr>
-        <p:txBody>
-          <a:bodyPr/>
-          <a:lstStyle/>
-          <a:p>
-            <a:pPr algn="ctr"/>
-            <a:r>
-              <a:rPr lang="en-US" dirty="0" smtClean="0">
-                <a:latin typeface="Berlin Sans FB" panose="020E0602020502020306" pitchFamily="34" charset="0"/>
-              </a:rPr>
-              <a:t>Step 4:Calculating </a:t>
-            </a:r>
-            <a:r>
-              <a:rPr lang="en-US" dirty="0">
-                <a:latin typeface="Berlin Sans FB" panose="020E0602020502020306" pitchFamily="34" charset="0"/>
-              </a:rPr>
-              <a:t>Percentiles</a:t>
-            </a:r>
-            <a:r>
-              <a:rPr lang="en-US" dirty="0"/>
-              <a:t> </a:t>
-            </a:r>
-          </a:p>
-        </p:txBody>
-      </p:sp>
-      <p:sp>
-        <p:nvSpPr>
-          <p:cNvPr id="3" name="Content Placeholder 2"/>
-          <p:cNvSpPr>
-            <a:spLocks noGrp="1"/>
-          </p:cNvSpPr>
-          <p:nvPr>
-            <p:ph idx="1"/>
-          </p:nvPr>
-        </p:nvSpPr>
-        <p:spPr>
-          <a:xfrm>
-            <a:off x="1104293" y="1180407"/>
-            <a:ext cx="8946541" cy="4959926"/>
-          </a:xfrm>
-        </p:spPr>
-        <p:txBody>
-          <a:bodyPr/>
-          <a:lstStyle/>
-          <a:p>
-            <a:r>
-              <a:rPr lang="en-US" dirty="0" smtClean="0">
-                <a:latin typeface="Berlin Sans FB" panose="020E0602020502020306" pitchFamily="34" charset="0"/>
-              </a:rPr>
-              <a:t>What is a Percentile?</a:t>
-            </a:r>
-          </a:p>
-          <a:p>
-            <a:pPr marL="0" indent="0">
-              <a:buNone/>
-            </a:pPr>
-            <a:r>
-              <a:rPr lang="en-US" dirty="0" smtClean="0">
-                <a:latin typeface="Berlin Sans FB" panose="020E0602020502020306" pitchFamily="34" charset="0"/>
-              </a:rPr>
-              <a:t>Percentile is a value below which a certain percentage of observations lie.</a:t>
-            </a:r>
-          </a:p>
-          <a:p>
-            <a:pPr marL="0" indent="0">
-              <a:buNone/>
-            </a:pPr>
-            <a:r>
-              <a:rPr lang="en-US" dirty="0" smtClean="0">
-                <a:latin typeface="Berlin Sans FB" panose="020E0602020502020306" pitchFamily="34" charset="0"/>
-              </a:rPr>
-              <a:t>Percentile 10 is a number that under it there are 10% of the samples in the data.</a:t>
-            </a:r>
-          </a:p>
-          <a:p>
-            <a:pPr marL="0" indent="0">
-              <a:buNone/>
-            </a:pPr>
-            <a:r>
-              <a:rPr lang="en-US" dirty="0" smtClean="0">
-                <a:latin typeface="Berlin Sans FB" panose="020E0602020502020306" pitchFamily="34" charset="0"/>
-              </a:rPr>
-              <a:t>It doesn’t have to be one of the data samples(like in this case).</a:t>
-            </a:r>
-          </a:p>
-          <a:p>
-            <a:r>
-              <a:rPr lang="en-US" dirty="0" smtClean="0">
-                <a:latin typeface="Berlin Sans FB" panose="020E0602020502020306" pitchFamily="34" charset="0"/>
-              </a:rPr>
-              <a:t>Prctile is a Matlab</a:t>
-            </a:r>
-            <a:r>
-              <a:rPr lang="en-US" dirty="0">
-                <a:latin typeface="Berlin Sans FB" panose="020E0602020502020306" pitchFamily="34" charset="0"/>
-              </a:rPr>
-              <a:t> </a:t>
-            </a:r>
-            <a:r>
-              <a:rPr lang="en-US" dirty="0" smtClean="0">
-                <a:latin typeface="Berlin Sans FB" panose="020E0602020502020306" pitchFamily="34" charset="0"/>
-              </a:rPr>
-              <a:t>Built-in Function:</a:t>
-            </a:r>
-            <a:endParaRPr lang="en-US" dirty="0">
-              <a:latin typeface="Berlin Sans FB" panose="020E0602020502020306" pitchFamily="34" charset="0"/>
-            </a:endParaRPr>
-          </a:p>
-          <a:p>
-            <a:endParaRPr lang="en-US" dirty="0" smtClean="0">
-              <a:latin typeface="Berlin Sans FB" panose="020E0602020502020306" pitchFamily="34" charset="0"/>
-            </a:endParaRPr>
-          </a:p>
-          <a:p>
-            <a:endParaRPr lang="en-US" dirty="0">
-              <a:latin typeface="Berlin Sans FB" panose="020E0602020502020306" pitchFamily="34" charset="0"/>
-            </a:endParaRPr>
-          </a:p>
-          <a:p>
-            <a:r>
-              <a:rPr lang="en-US" dirty="0" smtClean="0">
-                <a:latin typeface="Berlin Sans FB" panose="020E0602020502020306" pitchFamily="34" charset="0"/>
-              </a:rPr>
-              <a:t>I Used it with values 10 and 90:</a:t>
-            </a:r>
-            <a:endParaRPr lang="en-US" dirty="0">
-              <a:latin typeface="Berlin Sans FB" panose="020E0602020502020306" pitchFamily="34" charset="0"/>
-            </a:endParaRPr>
-          </a:p>
-        </p:txBody>
-      </p:sp>
-      <p:pic>
-        <p:nvPicPr>
-          <p:cNvPr id="4" name="Picture 3" descr="Screen Clipping"/>
-          <p:cNvPicPr>
-            <a:picLocks noChangeAspect="1"/>
-          </p:cNvPicPr>
-          <p:nvPr/>
-        </p:nvPicPr>
-        <p:blipFill>
-          <a:blip r:embed="rId2">
-            <a:extLst>
-              <a:ext uri="{28A0092B-C50C-407E-A947-70E740481C1C}">
-                <a14:useLocalDpi xmlns:a14="http://schemas.microsoft.com/office/drawing/2010/main" val="0"/>
-              </a:ext>
-            </a:extLst>
-          </a:blip>
-          <a:stretch>
-            <a:fillRect/>
-          </a:stretch>
-        </p:blipFill>
-        <p:spPr>
-          <a:xfrm>
-            <a:off x="1451776" y="3432273"/>
-            <a:ext cx="5048955" cy="752580"/>
-          </a:xfrm>
-          <a:prstGeom prst="rect">
-            <a:avLst/>
-          </a:prstGeom>
-        </p:spPr>
-      </p:pic>
-      <p:cxnSp>
-        <p:nvCxnSpPr>
-          <p:cNvPr id="7" name="Straight Arrow Connector 6"/>
-          <p:cNvCxnSpPr/>
-          <p:nvPr/>
-        </p:nvCxnSpPr>
-        <p:spPr>
-          <a:xfrm>
-            <a:off x="5669279" y="4987467"/>
-            <a:ext cx="1453673" cy="0"/>
-          </a:xfrm>
-          <a:prstGeom prst="straightConnector1">
-            <a:avLst/>
-          </a:prstGeom>
-          <a:ln>
-            <a:tailEnd type="triangle"/>
-          </a:ln>
-        </p:spPr>
-        <p:style>
-          <a:lnRef idx="2">
-            <a:schemeClr val="dk1"/>
-          </a:lnRef>
-          <a:fillRef idx="0">
-            <a:schemeClr val="dk1"/>
-          </a:fillRef>
-          <a:effectRef idx="1">
-            <a:schemeClr val="dk1"/>
-          </a:effectRef>
-          <a:fontRef idx="minor">
-            <a:schemeClr val="tx1"/>
-          </a:fontRef>
-        </p:style>
-      </p:cxnSp>
-      <p:pic>
-        <p:nvPicPr>
-          <p:cNvPr id="8" name="Picture 7" descr="Screen Clipping"/>
-          <p:cNvPicPr>
-            <a:picLocks noChangeAspect="1"/>
-          </p:cNvPicPr>
-          <p:nvPr/>
-        </p:nvPicPr>
-        <p:blipFill>
-          <a:blip r:embed="rId3">
-            <a:extLst>
-              <a:ext uri="{28A0092B-C50C-407E-A947-70E740481C1C}">
-                <a14:useLocalDpi xmlns:a14="http://schemas.microsoft.com/office/drawing/2010/main" val="0"/>
-              </a:ext>
-            </a:extLst>
-          </a:blip>
-          <a:stretch>
-            <a:fillRect/>
-          </a:stretch>
-        </p:blipFill>
-        <p:spPr>
-          <a:xfrm>
-            <a:off x="1104293" y="4536448"/>
-            <a:ext cx="4376590" cy="2250156"/>
-          </a:xfrm>
-          <a:prstGeom prst="rect">
-            <a:avLst/>
-          </a:prstGeom>
-        </p:spPr>
-      </p:pic>
-    </p:spTree>
-    <p:extLst>
-      <p:ext uri="{BB962C8B-B14F-4D97-AF65-F5344CB8AC3E}">
-        <p14:creationId xmlns:p14="http://schemas.microsoft.com/office/powerpoint/2010/main" val="544535038"/>
+        <p14:creationId xmlns:p14="http://schemas.microsoft.com/office/powerpoint/2010/main" val="1018271733"/>
       </p:ext>
     </p:extLst>
   </p:cSld>
@@ -7510,7 +7713,7 @@
 </p:sld>
 </file>
 
-<file path=ppt/slides/slide14.xml><?xml version="1.0" encoding="utf-8"?>
+<file path=ppt/slides/slide16.xml><?xml version="1.0" encoding="utf-8"?>
 <p:sld xmlns:a="http://schemas.openxmlformats.org/drawingml/2006/main" xmlns:r="http://schemas.openxmlformats.org/officeDocument/2006/relationships" xmlns:p="http://schemas.openxmlformats.org/presentationml/2006/main">
   <p:cSld>
     <p:spTree>
@@ -7978,7 +8181,7 @@
 </p:sld>
 </file>
 
-<file path=ppt/slides/slide15.xml><?xml version="1.0" encoding="utf-8"?>
+<file path=ppt/slides/slide17.xml><?xml version="1.0" encoding="utf-8"?>
 <p:sld xmlns:a="http://schemas.openxmlformats.org/drawingml/2006/main" xmlns:r="http://schemas.openxmlformats.org/officeDocument/2006/relationships" xmlns:p="http://schemas.openxmlformats.org/presentationml/2006/main">
   <p:cSld>
     <p:spTree>
@@ -8753,7 +8956,7 @@
 </p:sld>
 </file>
 
-<file path=ppt/slides/slide16.xml><?xml version="1.0" encoding="utf-8"?>
+<file path=ppt/slides/slide18.xml><?xml version="1.0" encoding="utf-8"?>
 <p:sld xmlns:a="http://schemas.openxmlformats.org/drawingml/2006/main" xmlns:r="http://schemas.openxmlformats.org/officeDocument/2006/relationships" xmlns:p="http://schemas.openxmlformats.org/presentationml/2006/main">
   <p:cSld>
     <p:spTree>
@@ -8787,53 +8990,48 @@
           <a:p>
             <a:pPr algn="ctr"/>
             <a:r>
-              <a:rPr lang="en-US" dirty="0">
-                <a:latin typeface="Berlin Sans FB" panose="020E0602020502020306" pitchFamily="34" charset="0"/>
-              </a:rPr>
-              <a:t>Step </a:t>
-            </a:r>
-            <a:r>
-              <a:rPr lang="en-US" dirty="0" smtClean="0">
-                <a:latin typeface="Berlin Sans FB" panose="020E0602020502020306" pitchFamily="34" charset="0"/>
-              </a:rPr>
-              <a:t>6:Plot Graph </a:t>
-            </a:r>
-            <a:r>
-              <a:rPr lang="en-US" dirty="0">
-                <a:latin typeface="Berlin Sans FB" panose="020E0602020502020306" pitchFamily="34" charset="0"/>
-              </a:rPr>
-              <a:t>of</a:t>
-            </a:r>
-            <a:r>
-              <a:rPr lang="en-US" dirty="0" smtClean="0">
-                <a:latin typeface="Berlin Sans FB" panose="020E0602020502020306" pitchFamily="34" charset="0"/>
-              </a:rPr>
-              <a:t/>
-            </a:r>
-            <a:br>
-              <a:rPr lang="en-US" dirty="0" smtClean="0">
-                <a:latin typeface="Berlin Sans FB" panose="020E0602020502020306" pitchFamily="34" charset="0"/>
-              </a:rPr>
-            </a:br>
-            <a:r>
-              <a:rPr lang="en-US" dirty="0" smtClean="0">
-                <a:latin typeface="Berlin Sans FB" panose="020E0602020502020306" pitchFamily="34" charset="0"/>
-              </a:rPr>
-              <a:t>Median&amp;Perecentiles</a:t>
+              <a:rPr lang="en-US" dirty="0" smtClean="0"/>
+              <a:t>Interpolation parameters</a:t>
             </a:r>
             <a:endParaRPr lang="en-US" dirty="0"/>
           </a:p>
         </p:txBody>
       </p:sp>
-      <p:pic>
-        <p:nvPicPr>
-          <p:cNvPr id="4" name="Content Placeholder 3" descr="Screen Clipping"/>
-          <p:cNvPicPr>
-            <a:picLocks noGrp="1" noChangeAspect="1"/>
-          </p:cNvPicPr>
+      <p:sp>
+        <p:nvSpPr>
+          <p:cNvPr id="3" name="Content Placeholder 2"/>
+          <p:cNvSpPr>
+            <a:spLocks noGrp="1"/>
+          </p:cNvSpPr>
           <p:nvPr>
             <p:ph idx="1"/>
           </p:nvPr>
+        </p:nvSpPr>
+        <p:spPr>
+          <a:xfrm>
+            <a:off x="559396" y="1396212"/>
+            <a:ext cx="8946541" cy="4195481"/>
+          </a:xfrm>
+        </p:spPr>
+        <p:txBody>
+          <a:bodyPr/>
+          <a:lstStyle/>
+          <a:p>
+            <a:r>
+              <a:rPr lang="en-US" dirty="0" smtClean="0"/>
+              <a:t>I used my own designed find_size(Step) function to find size of each step:</a:t>
+            </a:r>
+            <a:endParaRPr lang="en-US" dirty="0"/>
+          </a:p>
+        </p:txBody>
+      </p:sp>
+      <p:pic>
+        <p:nvPicPr>
+          <p:cNvPr id="4" name="Picture 3" descr="Screen Clipping"/>
+          <p:cNvPicPr>
+            <a:picLocks noChangeAspect="1"/>
+          </p:cNvPicPr>
+          <p:nvPr/>
         </p:nvPicPr>
         <p:blipFill>
           <a:blip r:embed="rId2">
@@ -8849,21 +9047,24 @@
         </p:blipFill>
         <p:spPr>
           <a:xfrm>
-            <a:off x="1011139" y="1944572"/>
-            <a:ext cx="3162958" cy="4195762"/>
-          </a:xfrm>
+            <a:off x="210891" y="2485506"/>
+            <a:ext cx="5765656" cy="3771371"/>
+          </a:xfrm>
+          <a:prstGeom prst="rect">
+            <a:avLst/>
+          </a:prstGeom>
         </p:spPr>
       </p:pic>
       <p:cxnSp>
         <p:nvCxnSpPr>
-          <p:cNvPr id="5" name="Straight Arrow Connector 4"/>
+          <p:cNvPr id="8" name="Straight Arrow Connector 7"/>
           <p:cNvCxnSpPr/>
           <p:nvPr/>
         </p:nvCxnSpPr>
         <p:spPr>
           <a:xfrm>
-            <a:off x="2668386" y="2552007"/>
-            <a:ext cx="2177934" cy="847898"/>
+            <a:off x="6217920" y="4181301"/>
+            <a:ext cx="407324" cy="0"/>
           </a:xfrm>
           <a:prstGeom prst="straightConnector1">
             <a:avLst/>
@@ -8887,118 +9088,385 @@
           </a:fontRef>
         </p:style>
       </p:cxnSp>
-      <p:cxnSp>
-        <p:nvCxnSpPr>
-          <p:cNvPr id="8" name="Straight Arrow Connector 7"/>
-          <p:cNvCxnSpPr/>
+      <p:pic>
+        <p:nvPicPr>
+          <p:cNvPr id="11" name="Picture 10" descr="Screen Clipping"/>
+          <p:cNvPicPr>
+            <a:picLocks noChangeAspect="1"/>
+          </p:cNvPicPr>
           <p:nvPr/>
-        </p:nvCxnSpPr>
-        <p:spPr>
-          <a:xfrm flipV="1">
-            <a:off x="2668386" y="3757353"/>
-            <a:ext cx="1961803" cy="127462"/>
-          </a:xfrm>
-          <a:prstGeom prst="straightConnector1">
-            <a:avLst/>
-          </a:prstGeom>
-          <a:ln>
-            <a:tailEnd type="triangle"/>
-          </a:ln>
-        </p:spPr>
-        <p:style>
-          <a:lnRef idx="2">
-            <a:schemeClr val="dk1"/>
-          </a:lnRef>
-          <a:fillRef idx="0">
-            <a:schemeClr val="dk1"/>
-          </a:fillRef>
-          <a:effectRef idx="1">
-            <a:schemeClr val="dk1"/>
-          </a:effectRef>
-          <a:fontRef idx="minor">
-            <a:schemeClr val="tx1"/>
-          </a:fontRef>
-        </p:style>
-      </p:cxnSp>
-      <p:cxnSp>
-        <p:nvCxnSpPr>
-          <p:cNvPr id="10" name="Straight Arrow Connector 9"/>
-          <p:cNvCxnSpPr/>
-          <p:nvPr/>
-        </p:nvCxnSpPr>
-        <p:spPr>
-          <a:xfrm flipV="1">
-            <a:off x="2770910" y="4042453"/>
-            <a:ext cx="2216726" cy="1341424"/>
-          </a:xfrm>
-          <a:prstGeom prst="straightConnector1">
-            <a:avLst/>
-          </a:prstGeom>
-          <a:ln>
-            <a:tailEnd type="triangle"/>
-          </a:ln>
-        </p:spPr>
-        <p:style>
-          <a:lnRef idx="2">
-            <a:schemeClr val="dk1"/>
-          </a:lnRef>
-          <a:fillRef idx="0">
-            <a:schemeClr val="dk1"/>
-          </a:fillRef>
-          <a:effectRef idx="1">
-            <a:schemeClr val="dk1"/>
-          </a:effectRef>
-          <a:fontRef idx="minor">
-            <a:schemeClr val="tx1"/>
-          </a:fontRef>
-        </p:style>
-      </p:cxnSp>
-      <p:sp>
-        <p:nvSpPr>
-          <p:cNvPr id="13" name="TextBox 12"/>
-          <p:cNvSpPr txBox="1"/>
-          <p:nvPr/>
-        </p:nvSpPr>
-        <p:spPr>
-          <a:xfrm>
-            <a:off x="4987636" y="3367236"/>
-            <a:ext cx="3217547" cy="707886"/>
+        </p:nvPicPr>
+        <p:blipFill>
+          <a:blip r:embed="rId3">
+            <a:extLst>
+              <a:ext uri="{28A0092B-C50C-407E-A947-70E740481C1C}">
+                <a14:useLocalDpi xmlns:a14="http://schemas.microsoft.com/office/drawing/2010/main" val="0"/>
+              </a:ext>
+            </a:extLst>
+          </a:blip>
+          <a:stretch>
+            <a:fillRect/>
+          </a:stretch>
+        </p:blipFill>
+        <p:spPr>
+          <a:xfrm>
+            <a:off x="6916646" y="3233431"/>
+            <a:ext cx="2686425" cy="1895740"/>
           </a:xfrm>
           <a:prstGeom prst="rect">
             <a:avLst/>
           </a:prstGeom>
-          <a:noFill/>
-        </p:spPr>
-        <p:txBody>
-          <a:bodyPr wrap="none" rtlCol="0">
-            <a:spAutoFit/>
-          </a:bodyPr>
-          <a:lstStyle/>
-          <a:p>
-            <a:r>
-              <a:rPr lang="en-US" sz="2000" dirty="0" smtClean="0">
-                <a:latin typeface="Berlin Sans FB" panose="020E0602020502020306" pitchFamily="34" charset="0"/>
-              </a:rPr>
-              <a:t>Showing Percentiles over the</a:t>
-            </a:r>
-          </a:p>
-          <a:p>
-            <a:r>
-              <a:rPr lang="en-US" sz="2000" dirty="0" smtClean="0">
-                <a:latin typeface="Berlin Sans FB" panose="020E0602020502020306" pitchFamily="34" charset="0"/>
-              </a:rPr>
-              <a:t> Median filtered graphs</a:t>
-            </a:r>
-            <a:endParaRPr lang="en-US" sz="2000" dirty="0">
-              <a:latin typeface="Berlin Sans FB" panose="020E0602020502020306" pitchFamily="34" charset="0"/>
-            </a:endParaRPr>
-          </a:p>
-        </p:txBody>
-      </p:sp>
+        </p:spPr>
+      </p:pic>
     </p:spTree>
     <p:extLst>
       <p:ext uri="{BB962C8B-B14F-4D97-AF65-F5344CB8AC3E}">
-        <p14:creationId xmlns:p14="http://schemas.microsoft.com/office/powerpoint/2010/main" val="701963166"/>
+        <p14:creationId xmlns:p14="http://schemas.microsoft.com/office/powerpoint/2010/main" val="1518240691"/>
+      </p:ext>
+    </p:extLst>
+  </p:cSld>
+  <p:clrMapOvr>
+    <a:masterClrMapping/>
+  </p:clrMapOvr>
+</p:sld>
+</file>
+
+<file path=ppt/slides/slide19.xml><?xml version="1.0" encoding="utf-8"?>
+<p:sld xmlns:a="http://schemas.openxmlformats.org/drawingml/2006/main" xmlns:r="http://schemas.openxmlformats.org/officeDocument/2006/relationships" xmlns:p="http://schemas.openxmlformats.org/presentationml/2006/main">
+  <p:cSld>
+    <p:spTree>
+      <p:nvGrpSpPr>
+        <p:cNvPr id="1" name=""/>
+        <p:cNvGrpSpPr/>
+        <p:nvPr/>
+      </p:nvGrpSpPr>
+      <p:grpSpPr>
+        <a:xfrm>
+          <a:off x="0" y="0"/>
+          <a:ext cx="0" cy="0"/>
+          <a:chOff x="0" y="0"/>
+          <a:chExt cx="0" cy="0"/>
+        </a:xfrm>
+      </p:grpSpPr>
+      <p:sp>
+        <p:nvSpPr>
+          <p:cNvPr id="2" name="Title 1"/>
+          <p:cNvSpPr>
+            <a:spLocks noGrp="1"/>
+          </p:cNvSpPr>
+          <p:nvPr>
+            <p:ph type="title"/>
+          </p:nvPr>
+        </p:nvSpPr>
+        <p:spPr/>
+        <p:txBody>
+          <a:bodyPr/>
+          <a:lstStyle/>
+          <a:p>
+            <a:pPr algn="ctr"/>
+            <a:r>
+              <a:rPr lang="en-US" dirty="0" smtClean="0"/>
+              <a:t>Interpolation</a:t>
+            </a:r>
+            <a:endParaRPr lang="en-US" dirty="0"/>
+          </a:p>
+        </p:txBody>
+      </p:sp>
+      <p:sp>
+        <p:nvSpPr>
+          <p:cNvPr id="3" name="Content Placeholder 2"/>
+          <p:cNvSpPr txBox="1">
+            <a:spLocks/>
+          </p:cNvSpPr>
+          <p:nvPr/>
+        </p:nvSpPr>
+        <p:spPr>
+          <a:xfrm>
+            <a:off x="875201" y="1152983"/>
+            <a:ext cx="8946541" cy="4959926"/>
+          </a:xfrm>
+          <a:prstGeom prst="rect">
+            <a:avLst/>
+          </a:prstGeom>
+        </p:spPr>
+        <p:txBody>
+          <a:bodyPr/>
+          <a:lstStyle>
+            <a:lvl1pPr marL="342900" indent="-342900" algn="l" defTabSz="457200" rtl="0" eaLnBrk="1" latinLnBrk="0" hangingPunct="1">
+              <a:spcBef>
+                <a:spcPts val="1000"/>
+              </a:spcBef>
+              <a:spcAft>
+                <a:spcPts val="0"/>
+              </a:spcAft>
+              <a:buClr>
+                <a:schemeClr val="accent1">
+                  <a:lumMod val="60000"/>
+                  <a:lumOff val="40000"/>
+                </a:schemeClr>
+              </a:buClr>
+              <a:buSzPct val="80000"/>
+              <a:buFont typeface="Wingdings 3" charset="2"/>
+              <a:buChar char=""/>
+              <a:defRPr sz="2000" b="0" i="0" kern="1200">
+                <a:solidFill>
+                  <a:schemeClr val="tx1"/>
+                </a:solidFill>
+                <a:latin typeface="+mj-lt"/>
+                <a:ea typeface="+mj-ea"/>
+                <a:cs typeface="+mj-cs"/>
+              </a:defRPr>
+            </a:lvl1pPr>
+            <a:lvl2pPr marL="742950" indent="-285750" algn="l" defTabSz="457200" rtl="0" eaLnBrk="1" latinLnBrk="0" hangingPunct="1">
+              <a:spcBef>
+                <a:spcPts val="1000"/>
+              </a:spcBef>
+              <a:spcAft>
+                <a:spcPts val="0"/>
+              </a:spcAft>
+              <a:buClr>
+                <a:schemeClr val="accent1">
+                  <a:lumMod val="60000"/>
+                  <a:lumOff val="40000"/>
+                </a:schemeClr>
+              </a:buClr>
+              <a:buSzPct val="80000"/>
+              <a:buFont typeface="Wingdings 3" charset="2"/>
+              <a:buChar char=""/>
+              <a:defRPr sz="1800" b="0" i="0" kern="1200">
+                <a:solidFill>
+                  <a:schemeClr val="tx1"/>
+                </a:solidFill>
+                <a:latin typeface="+mj-lt"/>
+                <a:ea typeface="+mj-ea"/>
+                <a:cs typeface="+mj-cs"/>
+              </a:defRPr>
+            </a:lvl2pPr>
+            <a:lvl3pPr marL="1143000" indent="-228600" algn="l" defTabSz="457200" rtl="0" eaLnBrk="1" latinLnBrk="0" hangingPunct="1">
+              <a:spcBef>
+                <a:spcPts val="1000"/>
+              </a:spcBef>
+              <a:spcAft>
+                <a:spcPts val="0"/>
+              </a:spcAft>
+              <a:buClr>
+                <a:schemeClr val="accent1">
+                  <a:lumMod val="60000"/>
+                  <a:lumOff val="40000"/>
+                </a:schemeClr>
+              </a:buClr>
+              <a:buSzPct val="80000"/>
+              <a:buFont typeface="Wingdings 3" charset="2"/>
+              <a:buChar char=""/>
+              <a:defRPr sz="1600" b="0" i="0" kern="1200">
+                <a:solidFill>
+                  <a:schemeClr val="tx1"/>
+                </a:solidFill>
+                <a:latin typeface="+mj-lt"/>
+                <a:ea typeface="+mj-ea"/>
+                <a:cs typeface="+mj-cs"/>
+              </a:defRPr>
+            </a:lvl3pPr>
+            <a:lvl4pPr marL="1600200" indent="-228600" algn="l" defTabSz="457200" rtl="0" eaLnBrk="1" latinLnBrk="0" hangingPunct="1">
+              <a:spcBef>
+                <a:spcPts val="1000"/>
+              </a:spcBef>
+              <a:spcAft>
+                <a:spcPts val="0"/>
+              </a:spcAft>
+              <a:buClr>
+                <a:schemeClr val="accent1">
+                  <a:lumMod val="60000"/>
+                  <a:lumOff val="40000"/>
+                </a:schemeClr>
+              </a:buClr>
+              <a:buSzPct val="80000"/>
+              <a:buFont typeface="Wingdings 3" charset="2"/>
+              <a:buChar char=""/>
+              <a:defRPr sz="1400" b="0" i="0" kern="1200">
+                <a:solidFill>
+                  <a:schemeClr val="tx1"/>
+                </a:solidFill>
+                <a:latin typeface="+mj-lt"/>
+                <a:ea typeface="+mj-ea"/>
+                <a:cs typeface="+mj-cs"/>
+              </a:defRPr>
+            </a:lvl4pPr>
+            <a:lvl5pPr marL="2057400" indent="-228600" algn="l" defTabSz="457200" rtl="0" eaLnBrk="1" latinLnBrk="0" hangingPunct="1">
+              <a:spcBef>
+                <a:spcPts val="1000"/>
+              </a:spcBef>
+              <a:spcAft>
+                <a:spcPts val="0"/>
+              </a:spcAft>
+              <a:buClr>
+                <a:schemeClr val="accent1">
+                  <a:lumMod val="60000"/>
+                  <a:lumOff val="40000"/>
+                </a:schemeClr>
+              </a:buClr>
+              <a:buSzPct val="80000"/>
+              <a:buFont typeface="Wingdings 3" charset="2"/>
+              <a:buChar char=""/>
+              <a:defRPr sz="1400" b="0" i="0" kern="1200">
+                <a:solidFill>
+                  <a:schemeClr val="tx1"/>
+                </a:solidFill>
+                <a:latin typeface="+mj-lt"/>
+                <a:ea typeface="+mj-ea"/>
+                <a:cs typeface="+mj-cs"/>
+              </a:defRPr>
+            </a:lvl5pPr>
+            <a:lvl6pPr marL="2514600" indent="-228600" algn="l" defTabSz="457200" rtl="0" eaLnBrk="1" latinLnBrk="0" hangingPunct="1">
+              <a:spcBef>
+                <a:spcPts val="1000"/>
+              </a:spcBef>
+              <a:spcAft>
+                <a:spcPts val="0"/>
+              </a:spcAft>
+              <a:buClr>
+                <a:schemeClr val="accent1">
+                  <a:lumMod val="60000"/>
+                  <a:lumOff val="40000"/>
+                </a:schemeClr>
+              </a:buClr>
+              <a:buSzPct val="80000"/>
+              <a:buFont typeface="Wingdings 3" charset="2"/>
+              <a:buChar char=""/>
+              <a:defRPr sz="1400" b="0" i="0" kern="1200">
+                <a:solidFill>
+                  <a:schemeClr val="tx1"/>
+                </a:solidFill>
+                <a:latin typeface="+mj-lt"/>
+                <a:ea typeface="+mj-ea"/>
+                <a:cs typeface="+mj-cs"/>
+              </a:defRPr>
+            </a:lvl6pPr>
+            <a:lvl7pPr marL="2971800" indent="-228600" algn="l" defTabSz="457200" rtl="0" eaLnBrk="1" latinLnBrk="0" hangingPunct="1">
+              <a:spcBef>
+                <a:spcPts val="1000"/>
+              </a:spcBef>
+              <a:spcAft>
+                <a:spcPts val="0"/>
+              </a:spcAft>
+              <a:buClr>
+                <a:schemeClr val="accent1">
+                  <a:lumMod val="60000"/>
+                  <a:lumOff val="40000"/>
+                </a:schemeClr>
+              </a:buClr>
+              <a:buSzPct val="80000"/>
+              <a:buFont typeface="Wingdings 3" charset="2"/>
+              <a:buChar char=""/>
+              <a:defRPr sz="1400" b="0" i="0" kern="1200">
+                <a:solidFill>
+                  <a:schemeClr val="tx1"/>
+                </a:solidFill>
+                <a:latin typeface="+mj-lt"/>
+                <a:ea typeface="+mj-ea"/>
+                <a:cs typeface="+mj-cs"/>
+              </a:defRPr>
+            </a:lvl7pPr>
+            <a:lvl8pPr marL="3429000" indent="-228600" algn="l" defTabSz="457200" rtl="0" eaLnBrk="1" latinLnBrk="0" hangingPunct="1">
+              <a:spcBef>
+                <a:spcPts val="1000"/>
+              </a:spcBef>
+              <a:spcAft>
+                <a:spcPts val="0"/>
+              </a:spcAft>
+              <a:buClr>
+                <a:schemeClr val="accent1">
+                  <a:lumMod val="60000"/>
+                  <a:lumOff val="40000"/>
+                </a:schemeClr>
+              </a:buClr>
+              <a:buSzPct val="80000"/>
+              <a:buFont typeface="Wingdings 3" charset="2"/>
+              <a:buChar char=""/>
+              <a:defRPr sz="1400" b="0" i="0" kern="1200">
+                <a:solidFill>
+                  <a:schemeClr val="tx1"/>
+                </a:solidFill>
+                <a:latin typeface="+mj-lt"/>
+                <a:ea typeface="+mj-ea"/>
+                <a:cs typeface="+mj-cs"/>
+              </a:defRPr>
+            </a:lvl8pPr>
+            <a:lvl9pPr marL="3886200" indent="-228600" algn="l" defTabSz="457200" rtl="0" eaLnBrk="1" latinLnBrk="0" hangingPunct="1">
+              <a:spcBef>
+                <a:spcPts val="1000"/>
+              </a:spcBef>
+              <a:spcAft>
+                <a:spcPts val="0"/>
+              </a:spcAft>
+              <a:buClr>
+                <a:schemeClr val="accent1">
+                  <a:lumMod val="60000"/>
+                  <a:lumOff val="40000"/>
+                </a:schemeClr>
+              </a:buClr>
+              <a:buSzPct val="80000"/>
+              <a:buFont typeface="Wingdings 3" charset="2"/>
+              <a:buChar char=""/>
+              <a:defRPr sz="1400" b="0" i="0" kern="1200">
+                <a:solidFill>
+                  <a:schemeClr val="tx1"/>
+                </a:solidFill>
+                <a:latin typeface="+mj-lt"/>
+                <a:ea typeface="+mj-ea"/>
+                <a:cs typeface="+mj-cs"/>
+              </a:defRPr>
+            </a:lvl9pPr>
+          </a:lstStyle>
+          <a:p>
+            <a:endParaRPr lang="en-US" dirty="0" smtClean="0">
+              <a:latin typeface="Berlin Sans FB" panose="020E0602020502020306" pitchFamily="34" charset="0"/>
+            </a:endParaRPr>
+          </a:p>
+          <a:p>
+            <a:r>
+              <a:rPr lang="en-US" sz="2200" dirty="0">
+                <a:latin typeface="Berlin Sans FB" panose="020E0602020502020306" pitchFamily="34" charset="0"/>
+              </a:rPr>
+              <a:t>Code Implementation:</a:t>
+            </a:r>
+          </a:p>
+        </p:txBody>
+      </p:sp>
+      <p:pic>
+        <p:nvPicPr>
+          <p:cNvPr id="4" name="Picture 3" descr="Screen Clipping"/>
+          <p:cNvPicPr>
+            <a:picLocks noChangeAspect="1"/>
+          </p:cNvPicPr>
+          <p:nvPr/>
+        </p:nvPicPr>
+        <p:blipFill>
+          <a:blip r:embed="rId2">
+            <a:extLst>
+              <a:ext uri="{28A0092B-C50C-407E-A947-70E740481C1C}">
+                <a14:useLocalDpi xmlns:a14="http://schemas.microsoft.com/office/drawing/2010/main" val="0"/>
+              </a:ext>
+            </a:extLst>
+          </a:blip>
+          <a:stretch>
+            <a:fillRect/>
+          </a:stretch>
+        </p:blipFill>
+        <p:spPr>
+          <a:xfrm>
+            <a:off x="1325198" y="2304044"/>
+            <a:ext cx="7297168" cy="2000529"/>
+          </a:xfrm>
+          <a:prstGeom prst="rect">
+            <a:avLst/>
+          </a:prstGeom>
+        </p:spPr>
+      </p:pic>
+    </p:spTree>
+    <p:extLst>
+      <p:ext uri="{BB962C8B-B14F-4D97-AF65-F5344CB8AC3E}">
+        <p14:creationId xmlns:p14="http://schemas.microsoft.com/office/powerpoint/2010/main" val="550251738"/>
       </p:ext>
     </p:extLst>
   </p:cSld>
@@ -9364,6 +9832,173 @@
       </p:par>
     </p:tnLst>
   </p:timing>
+</p:sld>
+</file>
+
+<file path=ppt/slides/slide20.xml><?xml version="1.0" encoding="utf-8"?>
+<p:sld xmlns:a="http://schemas.openxmlformats.org/drawingml/2006/main" xmlns:r="http://schemas.openxmlformats.org/officeDocument/2006/relationships" xmlns:p="http://schemas.openxmlformats.org/presentationml/2006/main">
+  <p:cSld>
+    <p:spTree>
+      <p:nvGrpSpPr>
+        <p:cNvPr id="1" name=""/>
+        <p:cNvGrpSpPr/>
+        <p:nvPr/>
+      </p:nvGrpSpPr>
+      <p:grpSpPr>
+        <a:xfrm>
+          <a:off x="0" y="0"/>
+          <a:ext cx="0" cy="0"/>
+          <a:chOff x="0" y="0"/>
+          <a:chExt cx="0" cy="0"/>
+        </a:xfrm>
+      </p:grpSpPr>
+      <p:sp>
+        <p:nvSpPr>
+          <p:cNvPr id="2" name="Title 1"/>
+          <p:cNvSpPr>
+            <a:spLocks noGrp="1"/>
+          </p:cNvSpPr>
+          <p:nvPr>
+            <p:ph type="title"/>
+          </p:nvPr>
+        </p:nvSpPr>
+        <p:spPr/>
+        <p:txBody>
+          <a:bodyPr/>
+          <a:lstStyle/>
+          <a:p>
+            <a:pPr algn="ctr"/>
+            <a:r>
+              <a:rPr lang="en-US" dirty="0">
+                <a:latin typeface="Berlin Sans FB" panose="020E0602020502020306" pitchFamily="34" charset="0"/>
+              </a:rPr>
+              <a:t>Step </a:t>
+            </a:r>
+            <a:r>
+              <a:rPr lang="en-US" dirty="0" smtClean="0">
+                <a:latin typeface="Berlin Sans FB" panose="020E0602020502020306" pitchFamily="34" charset="0"/>
+              </a:rPr>
+              <a:t>6:Plot Graph </a:t>
+            </a:r>
+            <a:r>
+              <a:rPr lang="en-US" dirty="0">
+                <a:latin typeface="Berlin Sans FB" panose="020E0602020502020306" pitchFamily="34" charset="0"/>
+              </a:rPr>
+              <a:t>of</a:t>
+            </a:r>
+            <a:r>
+              <a:rPr lang="en-US" dirty="0" smtClean="0">
+                <a:latin typeface="Berlin Sans FB" panose="020E0602020502020306" pitchFamily="34" charset="0"/>
+              </a:rPr>
+              <a:t/>
+            </a:r>
+            <a:br>
+              <a:rPr lang="en-US" dirty="0" smtClean="0">
+                <a:latin typeface="Berlin Sans FB" panose="020E0602020502020306" pitchFamily="34" charset="0"/>
+              </a:rPr>
+            </a:br>
+            <a:r>
+              <a:rPr lang="en-US" dirty="0" smtClean="0">
+                <a:latin typeface="Berlin Sans FB" panose="020E0602020502020306" pitchFamily="34" charset="0"/>
+              </a:rPr>
+              <a:t>Median&amp;Perecentiles</a:t>
+            </a:r>
+            <a:endParaRPr lang="en-US" dirty="0"/>
+          </a:p>
+        </p:txBody>
+      </p:sp>
+      <p:sp>
+        <p:nvSpPr>
+          <p:cNvPr id="13" name="TextBox 12"/>
+          <p:cNvSpPr txBox="1"/>
+          <p:nvPr/>
+        </p:nvSpPr>
+        <p:spPr>
+          <a:xfrm>
+            <a:off x="2834640" y="6409114"/>
+            <a:ext cx="5676554" cy="400110"/>
+          </a:xfrm>
+          <a:prstGeom prst="rect">
+            <a:avLst/>
+          </a:prstGeom>
+          <a:noFill/>
+        </p:spPr>
+        <p:txBody>
+          <a:bodyPr wrap="none" rtlCol="0">
+            <a:spAutoFit/>
+          </a:bodyPr>
+          <a:lstStyle/>
+          <a:p>
+            <a:r>
+              <a:rPr lang="en-US" sz="2000" dirty="0">
+                <a:latin typeface="Berlin Sans FB" panose="020E0602020502020306" pitchFamily="34" charset="0"/>
+              </a:rPr>
+              <a:t>Showing Median filtered </a:t>
+            </a:r>
+            <a:r>
+              <a:rPr lang="en-US" sz="2000" dirty="0" smtClean="0">
+                <a:latin typeface="Berlin Sans FB" panose="020E0602020502020306" pitchFamily="34" charset="0"/>
+              </a:rPr>
+              <a:t>over </a:t>
+            </a:r>
+            <a:r>
+              <a:rPr lang="en-US" sz="2000" dirty="0">
+                <a:latin typeface="Berlin Sans FB" panose="020E0602020502020306" pitchFamily="34" charset="0"/>
+              </a:rPr>
+              <a:t>the Percentiles </a:t>
+            </a:r>
+            <a:r>
+              <a:rPr lang="en-US" sz="2000" dirty="0" smtClean="0">
+                <a:latin typeface="Berlin Sans FB" panose="020E0602020502020306" pitchFamily="34" charset="0"/>
+              </a:rPr>
+              <a:t>graphs</a:t>
+            </a:r>
+            <a:endParaRPr lang="en-US" sz="2000" dirty="0">
+              <a:latin typeface="Berlin Sans FB" panose="020E0602020502020306" pitchFamily="34" charset="0"/>
+            </a:endParaRPr>
+          </a:p>
+        </p:txBody>
+      </p:sp>
+      <p:pic>
+        <p:nvPicPr>
+          <p:cNvPr id="6" name="Picture 5" descr="Screen Clipping"/>
+          <p:cNvPicPr>
+            <a:picLocks noChangeAspect="1"/>
+          </p:cNvPicPr>
+          <p:nvPr/>
+        </p:nvPicPr>
+        <p:blipFill>
+          <a:blip r:embed="rId2">
+            <a:extLst>
+              <a:ext uri="{28A0092B-C50C-407E-A947-70E740481C1C}">
+                <a14:useLocalDpi xmlns:a14="http://schemas.microsoft.com/office/drawing/2010/main" val="0"/>
+              </a:ext>
+            </a:extLst>
+          </a:blip>
+          <a:stretch>
+            <a:fillRect/>
+          </a:stretch>
+        </p:blipFill>
+        <p:spPr>
+          <a:xfrm>
+            <a:off x="440574" y="1925152"/>
+            <a:ext cx="10749069" cy="4483962"/>
+          </a:xfrm>
+          <a:prstGeom prst="rect">
+            <a:avLst/>
+          </a:prstGeom>
+        </p:spPr>
+      </p:pic>
+    </p:spTree>
+    <p:extLst>
+      <p:ext uri="{BB962C8B-B14F-4D97-AF65-F5344CB8AC3E}">
+        <p14:creationId xmlns:p14="http://schemas.microsoft.com/office/powerpoint/2010/main" val="701963166"/>
+      </p:ext>
+    </p:extLst>
+  </p:cSld>
+  <p:clrMapOvr>
+    <a:masterClrMapping/>
+  </p:clrMapOvr>
 </p:sld>
 </file>
 
@@ -12927,7 +13562,7 @@
       </p:sp>
       <p:pic>
         <p:nvPicPr>
-          <p:cNvPr id="4" name="Content Placeholder 3" descr="Screen Clipping"/>
+          <p:cNvPr id="5" name="Content Placeholder 4" descr="Screen Clipping"/>
           <p:cNvPicPr>
             <a:picLocks noGrp="1" noChangeAspect="1"/>
           </p:cNvPicPr>
@@ -12949,11 +13584,81 @@
         </p:blipFill>
         <p:spPr>
           <a:xfrm>
-            <a:off x="1791529" y="1254360"/>
-            <a:ext cx="7113885" cy="5393050"/>
+            <a:off x="897774" y="1290188"/>
+            <a:ext cx="6079420" cy="5490226"/>
           </a:xfrm>
         </p:spPr>
       </p:pic>
+      <p:sp>
+        <p:nvSpPr>
+          <p:cNvPr id="6" name="TextBox 5"/>
+          <p:cNvSpPr txBox="1"/>
+          <p:nvPr/>
+        </p:nvSpPr>
+        <p:spPr>
+          <a:xfrm>
+            <a:off x="7228858" y="2535382"/>
+            <a:ext cx="4949604" cy="2308324"/>
+          </a:xfrm>
+          <a:prstGeom prst="rect">
+            <a:avLst/>
+          </a:prstGeom>
+          <a:noFill/>
+        </p:spPr>
+        <p:txBody>
+          <a:bodyPr wrap="square" rtlCol="0">
+            <a:spAutoFit/>
+          </a:bodyPr>
+          <a:lstStyle/>
+          <a:p>
+            <a:r>
+              <a:rPr lang="en-US" dirty="0" smtClean="0"/>
+              <a:t>The idea of the algorithm is to</a:t>
+            </a:r>
+          </a:p>
+          <a:p>
+            <a:r>
+              <a:rPr lang="en-US" dirty="0" smtClean="0"/>
+              <a:t> check the first repetitive part which is</a:t>
+            </a:r>
+          </a:p>
+          <a:p>
+            <a:r>
+              <a:rPr lang="en-US" dirty="0" smtClean="0"/>
+              <a:t>Supposed to be within a range of -3 to 3</a:t>
+            </a:r>
+          </a:p>
+          <a:p>
+            <a:endParaRPr lang="en-US" dirty="0"/>
+          </a:p>
+          <a:p>
+            <a:endParaRPr lang="en-US" dirty="0" smtClean="0"/>
+          </a:p>
+          <a:p>
+            <a:r>
+              <a:rPr lang="en-US" dirty="0"/>
+              <a:t>I also used an </a:t>
+            </a:r>
+            <a:r>
+              <a:rPr lang="en-US" dirty="0" smtClean="0"/>
+              <a:t>Auxiliary Array to make sure</a:t>
+            </a:r>
+          </a:p>
+          <a:p>
+            <a:r>
+              <a:rPr lang="en-US" dirty="0" smtClean="0"/>
+              <a:t>That the cut of the beginning is not too </a:t>
+            </a:r>
+          </a:p>
+          <a:p>
+            <a:r>
+              <a:rPr lang="en-US" dirty="0" smtClean="0"/>
+              <a:t>Long(more than 100).</a:t>
+            </a:r>
+            <a:endParaRPr lang="en-US" dirty="0"/>
+          </a:p>
+        </p:txBody>
+      </p:sp>
     </p:spTree>
     <p:extLst>
       <p:ext uri="{BB962C8B-B14F-4D97-AF65-F5344CB8AC3E}">

</xml_diff>